<commit_message>
Update PowerFX embedding session.pptx
</commit_message>
<xml_diff>
--- a/src-powerfx/slides/PowerFX embedding session.pptx
+++ b/src-powerfx/slides/PowerFX embedding session.pptx
@@ -5,7 +5,7 @@
     <p:sldMasterId id="2147483648" r:id="rId1"/>
   </p:sldMasterIdLst>
   <p:notesMasterIdLst>
-    <p:notesMasterId r:id="rId18"/>
+    <p:notesMasterId r:id="rId19"/>
   </p:notesMasterIdLst>
   <p:sldIdLst>
     <p:sldId id="256" r:id="rId2"/>
@@ -13,17 +13,18 @@
     <p:sldId id="257" r:id="rId4"/>
     <p:sldId id="271" r:id="rId5"/>
     <p:sldId id="258" r:id="rId6"/>
-    <p:sldId id="267" r:id="rId7"/>
-    <p:sldId id="268" r:id="rId8"/>
-    <p:sldId id="265" r:id="rId9"/>
-    <p:sldId id="260" r:id="rId10"/>
-    <p:sldId id="259" r:id="rId11"/>
-    <p:sldId id="261" r:id="rId12"/>
-    <p:sldId id="262" r:id="rId13"/>
-    <p:sldId id="269" r:id="rId14"/>
-    <p:sldId id="270" r:id="rId15"/>
-    <p:sldId id="263" r:id="rId16"/>
-    <p:sldId id="264" r:id="rId17"/>
+    <p:sldId id="273" r:id="rId7"/>
+    <p:sldId id="267" r:id="rId8"/>
+    <p:sldId id="268" r:id="rId9"/>
+    <p:sldId id="265" r:id="rId10"/>
+    <p:sldId id="260" r:id="rId11"/>
+    <p:sldId id="259" r:id="rId12"/>
+    <p:sldId id="261" r:id="rId13"/>
+    <p:sldId id="262" r:id="rId14"/>
+    <p:sldId id="269" r:id="rId15"/>
+    <p:sldId id="270" r:id="rId16"/>
+    <p:sldId id="263" r:id="rId17"/>
+    <p:sldId id="264" r:id="rId18"/>
   </p:sldIdLst>
   <p:sldSz cx="12192000" cy="6858000"/>
   <p:notesSz cx="6858000" cy="9144000"/>
@@ -3924,7 +3925,13 @@
   <p:cSld>
     <p:spTree>
       <p:nvGrpSpPr>
-        <p:cNvPr id="1" name=""/>
+        <p:cNvPr id="1" name="">
+          <a:extLst>
+            <a:ext uri="{FF2B5EF4-FFF2-40B4-BE49-F238E27FC236}">
+              <a16:creationId xmlns:a16="http://schemas.microsoft.com/office/drawing/2014/main" id="{569CA3A5-22AF-DD8C-00D6-BEC44910FBA9}"/>
+            </a:ext>
+          </a:extLst>
+        </p:cNvPr>
         <p:cNvGrpSpPr/>
         <p:nvPr/>
       </p:nvGrpSpPr>
@@ -3938,7 +3945,13 @@
       </p:grpSpPr>
       <p:sp>
         <p:nvSpPr>
-          <p:cNvPr id="2" name="Slide Image Placeholder 1"/>
+          <p:cNvPr id="2" name="Slide Image Placeholder 1">
+            <a:extLst>
+              <a:ext uri="{FF2B5EF4-FFF2-40B4-BE49-F238E27FC236}">
+                <a16:creationId xmlns:a16="http://schemas.microsoft.com/office/drawing/2014/main" id="{0E3606CC-1D5F-DFBD-43F2-4DF0ACFF201F}"/>
+              </a:ext>
+            </a:extLst>
+          </p:cNvPr>
           <p:cNvSpPr>
             <a:spLocks noGrp="1" noRot="1" noChangeAspect="1"/>
           </p:cNvSpPr>
@@ -3950,7 +3963,13 @@
       </p:sp>
       <p:sp>
         <p:nvSpPr>
-          <p:cNvPr id="3" name="Notes Placeholder 2"/>
+          <p:cNvPr id="3" name="Notes Placeholder 2">
+            <a:extLst>
+              <a:ext uri="{FF2B5EF4-FFF2-40B4-BE49-F238E27FC236}">
+                <a16:creationId xmlns:a16="http://schemas.microsoft.com/office/drawing/2014/main" id="{43182516-3ED4-7437-D0E9-AF86A66FCCFE}"/>
+              </a:ext>
+            </a:extLst>
+          </p:cNvPr>
           <p:cNvSpPr>
             <a:spLocks noGrp="1"/>
           </p:cNvSpPr>
@@ -3963,13 +3982,33 @@
           <a:bodyPr/>
           <a:lstStyle/>
           <a:p>
-            <a:endParaRPr lang="en-US"/>
+            <a:r>
+              <a:rPr lang="en-US" dirty="0"/>
+              <a:t>We need to talk about what is and what is not Business Logic (aka Business Rules). I will give you my definition that I have found from experience </a:t>
+            </a:r>
+            <a:r>
+              <a:rPr lang="en-US"/>
+              <a:t>over the years. </a:t>
+            </a:r>
+            <a:endParaRPr lang="en-US" dirty="0"/>
+          </a:p>
+          <a:p>
+            <a:r>
+              <a:rPr lang="en-US" dirty="0"/>
+              <a:t> </a:t>
+            </a:r>
           </a:p>
         </p:txBody>
       </p:sp>
       <p:sp>
         <p:nvSpPr>
-          <p:cNvPr id="4" name="Slide Number Placeholder 3"/>
+          <p:cNvPr id="4" name="Slide Number Placeholder 3">
+            <a:extLst>
+              <a:ext uri="{FF2B5EF4-FFF2-40B4-BE49-F238E27FC236}">
+                <a16:creationId xmlns:a16="http://schemas.microsoft.com/office/drawing/2014/main" id="{644C8AB5-A7B7-CAEE-2EC0-27C5E6BD9EE8}"/>
+              </a:ext>
+            </a:extLst>
+          </p:cNvPr>
           <p:cNvSpPr>
             <a:spLocks noGrp="1"/>
           </p:cNvSpPr>
@@ -3993,7 +4032,7 @@
     </p:spTree>
     <p:extLst>
       <p:ext uri="{BB962C8B-B14F-4D97-AF65-F5344CB8AC3E}">
-        <p14:creationId xmlns:p14="http://schemas.microsoft.com/office/powerpoint/2010/main" val="1107287744"/>
+        <p14:creationId xmlns:p14="http://schemas.microsoft.com/office/powerpoint/2010/main" val="904800643"/>
       </p:ext>
     </p:extLst>
   </p:cSld>
@@ -4047,7 +4086,49 @@
           <a:bodyPr/>
           <a:lstStyle/>
           <a:p>
-            <a:endParaRPr lang="en-US"/>
+            <a:r>
+              <a:rPr lang="en-US" dirty="0"/>
+              <a:t>Alexandria starts to engage the Business Units to try to find out what tools they use every day, in an effort find patterns that then she can use to help them with the changes they request.</a:t>
+            </a:r>
+          </a:p>
+          <a:p>
+            <a:r>
+              <a:rPr lang="en-US" dirty="0"/>
+              <a:t>She observes that many in the </a:t>
+            </a:r>
+            <a:r>
+              <a:rPr lang="en-US" dirty="0" err="1"/>
+              <a:t>the</a:t>
+            </a:r>
+            <a:r>
+              <a:rPr lang="en-US" dirty="0"/>
+              <a:t> business units are very good Excel users. Many the apps Alexandria created for them had their </a:t>
+            </a:r>
+            <a:r>
+              <a:rPr lang="en-US" dirty="0" err="1"/>
+              <a:t>originins</a:t>
+            </a:r>
+            <a:r>
+              <a:rPr lang="en-US" dirty="0"/>
+              <a:t> on an Excel file created by business user that then grow into a critical business resource.</a:t>
+            </a:r>
+          </a:p>
+          <a:p>
+            <a:r>
+              <a:rPr lang="en-US" dirty="0"/>
+              <a:t>She learns that some of the requests from the business go to a larger IT team, different from the Development team. This team uses the Microsoft </a:t>
+            </a:r>
+            <a:r>
+              <a:rPr lang="en-US" dirty="0" err="1"/>
+              <a:t>PowerPlatform</a:t>
+            </a:r>
+            <a:r>
+              <a:rPr lang="en-US" dirty="0"/>
+              <a:t> to build solutions for the business. However, quite a good part of those requests are too complex or fall outside the skills of that team, so the requests get redirected to the Dev Team to be addressed by custom software.</a:t>
+            </a:r>
+          </a:p>
+          <a:p>
+            <a:endParaRPr lang="en-US" dirty="0"/>
           </a:p>
         </p:txBody>
       </p:sp>
@@ -4077,7 +4158,228 @@
     </p:spTree>
     <p:extLst>
       <p:ext uri="{BB962C8B-B14F-4D97-AF65-F5344CB8AC3E}">
+        <p14:creationId xmlns:p14="http://schemas.microsoft.com/office/powerpoint/2010/main" val="1107287744"/>
+      </p:ext>
+    </p:extLst>
+  </p:cSld>
+  <p:clrMapOvr>
+    <a:masterClrMapping/>
+  </p:clrMapOvr>
+</p:notes>
+</file>
+
+<file path=ppt/notesSlides/notesSlide8.xml><?xml version="1.0" encoding="utf-8"?>
+<p:notes xmlns:a="http://schemas.openxmlformats.org/drawingml/2006/main" xmlns:r="http://schemas.openxmlformats.org/officeDocument/2006/relationships" xmlns:p="http://schemas.openxmlformats.org/presentationml/2006/main">
+  <p:cSld>
+    <p:spTree>
+      <p:nvGrpSpPr>
+        <p:cNvPr id="1" name=""/>
+        <p:cNvGrpSpPr/>
+        <p:nvPr/>
+      </p:nvGrpSpPr>
+      <p:grpSpPr>
+        <a:xfrm>
+          <a:off x="0" y="0"/>
+          <a:ext cx="0" cy="0"/>
+          <a:chOff x="0" y="0"/>
+          <a:chExt cx="0" cy="0"/>
+        </a:xfrm>
+      </p:grpSpPr>
+      <p:sp>
+        <p:nvSpPr>
+          <p:cNvPr id="2" name="Slide Image Placeholder 1"/>
+          <p:cNvSpPr>
+            <a:spLocks noGrp="1" noRot="1" noChangeAspect="1"/>
+          </p:cNvSpPr>
+          <p:nvPr>
+            <p:ph type="sldImg"/>
+          </p:nvPr>
+        </p:nvSpPr>
+        <p:spPr/>
+      </p:sp>
+      <p:sp>
+        <p:nvSpPr>
+          <p:cNvPr id="3" name="Notes Placeholder 2"/>
+          <p:cNvSpPr>
+            <a:spLocks noGrp="1"/>
+          </p:cNvSpPr>
+          <p:nvPr>
+            <p:ph type="body" idx="1"/>
+          </p:nvPr>
+        </p:nvSpPr>
+        <p:spPr/>
+        <p:txBody>
+          <a:bodyPr/>
+          <a:lstStyle/>
+          <a:p>
+            <a:r>
+              <a:rPr lang="en-US" dirty="0"/>
+              <a:t>Alexandria starts looking for tools that can assist the business units with coming with solutions to their needs. She finds many applications and </a:t>
+            </a:r>
+            <a:r>
+              <a:rPr lang="en-US" dirty="0" err="1"/>
+              <a:t>frmeworks</a:t>
+            </a:r>
+            <a:r>
+              <a:rPr lang="en-US" dirty="0"/>
+              <a:t> whose purpose is to define and execute business. </a:t>
+            </a:r>
+          </a:p>
+          <a:p>
+            <a:r>
+              <a:rPr lang="en-US" dirty="0"/>
+              <a:t>A lot of the software out there for business rules is actually pretty mature, with </a:t>
+            </a:r>
+            <a:r>
+              <a:rPr lang="en-US" dirty="0" err="1"/>
+              <a:t>frameowkrs</a:t>
+            </a:r>
+            <a:r>
+              <a:rPr lang="en-US" dirty="0"/>
+              <a:t> such as Drools, and Camunda’s DNN. However, as good as those tools are, they are not a good fit for her org because most of those tools are Java based and would require the business units to learn new paradigms and syntaxes.</a:t>
+            </a:r>
+          </a:p>
+          <a:p>
+            <a:r>
+              <a:rPr lang="en-US" dirty="0"/>
+              <a:t>Alexandria does find that Microsoft has an Open Source engine for </a:t>
+            </a:r>
+            <a:r>
+              <a:rPr lang="en-US" dirty="0" err="1"/>
+              <a:t>.net</a:t>
+            </a:r>
+            <a:r>
+              <a:rPr lang="en-US" dirty="0"/>
+              <a:t> for rules. Even though this one is based in </a:t>
+            </a:r>
+            <a:r>
+              <a:rPr lang="en-US" dirty="0" err="1"/>
+              <a:t>.net</a:t>
+            </a:r>
+            <a:r>
+              <a:rPr lang="en-US" dirty="0"/>
+              <a:t>, the syntax is still a little bit unfamiliar to the business.</a:t>
+            </a:r>
+          </a:p>
+          <a:p>
+            <a:r>
+              <a:rPr lang="en-US" dirty="0"/>
+              <a:t>Another approach she finds is using Windows Workflows as a business friendly to define business logic.</a:t>
+            </a:r>
+          </a:p>
+        </p:txBody>
+      </p:sp>
+      <p:sp>
+        <p:nvSpPr>
+          <p:cNvPr id="4" name="Slide Number Placeholder 3"/>
+          <p:cNvSpPr>
+            <a:spLocks noGrp="1"/>
+          </p:cNvSpPr>
+          <p:nvPr>
+            <p:ph type="sldNum" sz="quarter" idx="5"/>
+          </p:nvPr>
+        </p:nvSpPr>
+        <p:spPr/>
+        <p:txBody>
+          <a:bodyPr/>
+          <a:lstStyle/>
+          <a:p>
+            <a:fld id="{A3FADD39-AB8A-4278-99D9-40CD8D745BA1}" type="slidenum">
+              <a:rPr lang="en-US" smtClean="0"/>
+              <a:t>8</a:t>
+            </a:fld>
+            <a:endParaRPr lang="en-US"/>
+          </a:p>
+        </p:txBody>
+      </p:sp>
+    </p:spTree>
+    <p:extLst>
+      <p:ext uri="{BB962C8B-B14F-4D97-AF65-F5344CB8AC3E}">
         <p14:creationId xmlns:p14="http://schemas.microsoft.com/office/powerpoint/2010/main" val="2463375002"/>
+      </p:ext>
+    </p:extLst>
+  </p:cSld>
+  <p:clrMapOvr>
+    <a:masterClrMapping/>
+  </p:clrMapOvr>
+</p:notes>
+</file>
+
+<file path=ppt/notesSlides/notesSlide9.xml><?xml version="1.0" encoding="utf-8"?>
+<p:notes xmlns:a="http://schemas.openxmlformats.org/drawingml/2006/main" xmlns:r="http://schemas.openxmlformats.org/officeDocument/2006/relationships" xmlns:p="http://schemas.openxmlformats.org/presentationml/2006/main">
+  <p:cSld>
+    <p:spTree>
+      <p:nvGrpSpPr>
+        <p:cNvPr id="1" name=""/>
+        <p:cNvGrpSpPr/>
+        <p:nvPr/>
+      </p:nvGrpSpPr>
+      <p:grpSpPr>
+        <a:xfrm>
+          <a:off x="0" y="0"/>
+          <a:ext cx="0" cy="0"/>
+          <a:chOff x="0" y="0"/>
+          <a:chExt cx="0" cy="0"/>
+        </a:xfrm>
+      </p:grpSpPr>
+      <p:sp>
+        <p:nvSpPr>
+          <p:cNvPr id="2" name="Slide Image Placeholder 1"/>
+          <p:cNvSpPr>
+            <a:spLocks noGrp="1" noRot="1" noChangeAspect="1"/>
+          </p:cNvSpPr>
+          <p:nvPr>
+            <p:ph type="sldImg"/>
+          </p:nvPr>
+        </p:nvSpPr>
+        <p:spPr/>
+      </p:sp>
+      <p:sp>
+        <p:nvSpPr>
+          <p:cNvPr id="3" name="Notes Placeholder 2"/>
+          <p:cNvSpPr>
+            <a:spLocks noGrp="1"/>
+          </p:cNvSpPr>
+          <p:nvPr>
+            <p:ph type="body" idx="1"/>
+          </p:nvPr>
+        </p:nvSpPr>
+        <p:spPr/>
+        <p:txBody>
+          <a:bodyPr/>
+          <a:lstStyle/>
+          <a:p>
+            <a:endParaRPr lang="en-US"/>
+          </a:p>
+        </p:txBody>
+      </p:sp>
+      <p:sp>
+        <p:nvSpPr>
+          <p:cNvPr id="4" name="Slide Number Placeholder 3"/>
+          <p:cNvSpPr>
+            <a:spLocks noGrp="1"/>
+          </p:cNvSpPr>
+          <p:nvPr>
+            <p:ph type="sldNum" sz="quarter" idx="5"/>
+          </p:nvPr>
+        </p:nvSpPr>
+        <p:spPr/>
+        <p:txBody>
+          <a:bodyPr/>
+          <a:lstStyle/>
+          <a:p>
+            <a:fld id="{A3FADD39-AB8A-4278-99D9-40CD8D745BA1}" type="slidenum">
+              <a:rPr lang="en-US" smtClean="0"/>
+              <a:t>9</a:t>
+            </a:fld>
+            <a:endParaRPr lang="en-US"/>
+          </a:p>
+        </p:txBody>
+      </p:sp>
+    </p:spTree>
+    <p:extLst>
+      <p:ext uri="{BB962C8B-B14F-4D97-AF65-F5344CB8AC3E}">
+        <p14:creationId xmlns:p14="http://schemas.microsoft.com/office/powerpoint/2010/main" val="3461771002"/>
       </p:ext>
     </p:extLst>
   </p:cSld>
@@ -7981,6 +8283,89 @@
 <file path=ppt/slides/slide10.xml><?xml version="1.0" encoding="utf-8"?>
 <p:sld xmlns:a="http://schemas.openxmlformats.org/drawingml/2006/main" xmlns:r="http://schemas.openxmlformats.org/officeDocument/2006/relationships" xmlns:p="http://schemas.openxmlformats.org/presentationml/2006/main">
   <p:cSld>
+    <p:spTree>
+      <p:nvGrpSpPr>
+        <p:cNvPr id="1" name=""/>
+        <p:cNvGrpSpPr/>
+        <p:nvPr/>
+      </p:nvGrpSpPr>
+      <p:grpSpPr>
+        <a:xfrm>
+          <a:off x="0" y="0"/>
+          <a:ext cx="0" cy="0"/>
+          <a:chOff x="0" y="0"/>
+          <a:chExt cx="0" cy="0"/>
+        </a:xfrm>
+      </p:grpSpPr>
+      <p:sp>
+        <p:nvSpPr>
+          <p:cNvPr id="4" name="Title 3">
+            <a:extLst>
+              <a:ext uri="{FF2B5EF4-FFF2-40B4-BE49-F238E27FC236}">
+                <a16:creationId xmlns:a16="http://schemas.microsoft.com/office/drawing/2014/main" id="{47C3B51B-CD1E-84E5-E7B2-ED12B12BB2EC}"/>
+              </a:ext>
+            </a:extLst>
+          </p:cNvPr>
+          <p:cNvSpPr>
+            <a:spLocks noGrp="1"/>
+          </p:cNvSpPr>
+          <p:nvPr>
+            <p:ph type="ctrTitle"/>
+          </p:nvPr>
+        </p:nvSpPr>
+        <p:spPr/>
+        <p:txBody>
+          <a:bodyPr/>
+          <a:lstStyle/>
+          <a:p>
+            <a:r>
+              <a:rPr lang="en-US" dirty="0"/>
+              <a:t>Demo</a:t>
+            </a:r>
+          </a:p>
+        </p:txBody>
+      </p:sp>
+      <p:sp>
+        <p:nvSpPr>
+          <p:cNvPr id="5" name="Subtitle 4">
+            <a:extLst>
+              <a:ext uri="{FF2B5EF4-FFF2-40B4-BE49-F238E27FC236}">
+                <a16:creationId xmlns:a16="http://schemas.microsoft.com/office/drawing/2014/main" id="{C3E3E2C1-3777-0AA9-FFD7-C0605B1B0494}"/>
+              </a:ext>
+            </a:extLst>
+          </p:cNvPr>
+          <p:cNvSpPr>
+            <a:spLocks noGrp="1"/>
+          </p:cNvSpPr>
+          <p:nvPr>
+            <p:ph type="subTitle" idx="1"/>
+          </p:nvPr>
+        </p:nvSpPr>
+        <p:spPr/>
+        <p:txBody>
+          <a:bodyPr/>
+          <a:lstStyle/>
+          <a:p>
+            <a:endParaRPr lang="en-US"/>
+          </a:p>
+        </p:txBody>
+      </p:sp>
+    </p:spTree>
+    <p:extLst>
+      <p:ext uri="{BB962C8B-B14F-4D97-AF65-F5344CB8AC3E}">
+        <p14:creationId xmlns:p14="http://schemas.microsoft.com/office/powerpoint/2010/main" val="2253528452"/>
+      </p:ext>
+    </p:extLst>
+  </p:cSld>
+  <p:clrMapOvr>
+    <a:masterClrMapping/>
+  </p:clrMapOvr>
+</p:sld>
+</file>
+
+<file path=ppt/slides/slide11.xml><?xml version="1.0" encoding="utf-8"?>
+<p:sld xmlns:a="http://schemas.openxmlformats.org/drawingml/2006/main" xmlns:r="http://schemas.openxmlformats.org/officeDocument/2006/relationships" xmlns:p="http://schemas.openxmlformats.org/presentationml/2006/main">
+  <p:cSld>
     <p:bg>
       <p:bgPr>
         <a:solidFill>
@@ -8822,7 +9207,7 @@
 </p:sld>
 </file>
 
-<file path=ppt/slides/slide11.xml><?xml version="1.0" encoding="utf-8"?>
+<file path=ppt/slides/slide12.xml><?xml version="1.0" encoding="utf-8"?>
 <p:sld xmlns:a="http://schemas.openxmlformats.org/drawingml/2006/main" xmlns:r="http://schemas.openxmlformats.org/officeDocument/2006/relationships" xmlns:p="http://schemas.openxmlformats.org/presentationml/2006/main">
   <p:cSld>
     <p:spTree>
@@ -8911,7 +9296,7 @@
 </p:sld>
 </file>
 
-<file path=ppt/slides/slide12.xml><?xml version="1.0" encoding="utf-8"?>
+<file path=ppt/slides/slide13.xml><?xml version="1.0" encoding="utf-8"?>
 <p:sld xmlns:a="http://schemas.openxmlformats.org/drawingml/2006/main" xmlns:r="http://schemas.openxmlformats.org/officeDocument/2006/relationships" xmlns:p="http://schemas.openxmlformats.org/presentationml/2006/main">
   <p:cSld>
     <p:bg>
@@ -9762,7 +10147,7 @@
 </p:sld>
 </file>
 
-<file path=ppt/slides/slide13.xml><?xml version="1.0" encoding="utf-8"?>
+<file path=ppt/slides/slide14.xml><?xml version="1.0" encoding="utf-8"?>
 <p:sld xmlns:a="http://schemas.openxmlformats.org/drawingml/2006/main" xmlns:r="http://schemas.openxmlformats.org/officeDocument/2006/relationships" xmlns:p="http://schemas.openxmlformats.org/presentationml/2006/main">
   <p:cSld>
     <p:bg>
@@ -10594,7 +10979,7 @@
 </p:sld>
 </file>
 
-<file path=ppt/slides/slide14.xml><?xml version="1.0" encoding="utf-8"?>
+<file path=ppt/slides/slide15.xml><?xml version="1.0" encoding="utf-8"?>
 <p:sld xmlns:a="http://schemas.openxmlformats.org/drawingml/2006/main" xmlns:r="http://schemas.openxmlformats.org/officeDocument/2006/relationships" xmlns:p="http://schemas.openxmlformats.org/presentationml/2006/main">
   <p:cSld>
     <p:bg>
@@ -11426,7 +11811,7 @@
 </p:sld>
 </file>
 
-<file path=ppt/slides/slide15.xml><?xml version="1.0" encoding="utf-8"?>
+<file path=ppt/slides/slide16.xml><?xml version="1.0" encoding="utf-8"?>
 <p:sld xmlns:a="http://schemas.openxmlformats.org/drawingml/2006/main" xmlns:r="http://schemas.openxmlformats.org/officeDocument/2006/relationships" xmlns:p="http://schemas.openxmlformats.org/presentationml/2006/main">
   <p:cSld>
     <p:spTree>
@@ -11515,7 +11900,7 @@
 </p:sld>
 </file>
 
-<file path=ppt/slides/slide16.xml><?xml version="1.0" encoding="utf-8"?>
+<file path=ppt/slides/slide17.xml><?xml version="1.0" encoding="utf-8"?>
 <p:sld xmlns:a="http://schemas.openxmlformats.org/drawingml/2006/main" xmlns:r="http://schemas.openxmlformats.org/officeDocument/2006/relationships" xmlns:p="http://schemas.openxmlformats.org/presentationml/2006/main">
   <p:cSld>
     <p:bg>
@@ -14538,6 +14923,859 @@
         <p:cNvPr id="1" name="">
           <a:extLst>
             <a:ext uri="{FF2B5EF4-FFF2-40B4-BE49-F238E27FC236}">
+              <a16:creationId xmlns:a16="http://schemas.microsoft.com/office/drawing/2014/main" id="{6D1DC4CF-4AB5-0446-B26D-657B29F30197}"/>
+            </a:ext>
+          </a:extLst>
+        </p:cNvPr>
+        <p:cNvGrpSpPr/>
+        <p:nvPr/>
+      </p:nvGrpSpPr>
+      <p:grpSpPr>
+        <a:xfrm>
+          <a:off x="0" y="0"/>
+          <a:ext cx="0" cy="0"/>
+          <a:chOff x="0" y="0"/>
+          <a:chExt cx="0" cy="0"/>
+        </a:xfrm>
+      </p:grpSpPr>
+      <p:sp useBgFill="1">
+        <p:nvSpPr>
+          <p:cNvPr id="8" name="Rectangle 7">
+            <a:extLst>
+              <a:ext uri="{FF2B5EF4-FFF2-40B4-BE49-F238E27FC236}">
+                <a16:creationId xmlns:a16="http://schemas.microsoft.com/office/drawing/2014/main" id="{E54B72FC-B4D7-7E3A-A879-719B20351377}"/>
+              </a:ext>
+              <a:ext uri="{C183D7F6-B498-43B3-948B-1728B52AA6E4}">
+                <adec:decorative xmlns:adec="http://schemas.microsoft.com/office/drawing/2017/decorative" val="1"/>
+              </a:ext>
+            </a:extLst>
+          </p:cNvPr>
+          <p:cNvSpPr>
+            <a:spLocks noGrp="1" noRot="1" noChangeAspect="1" noMove="1" noResize="1" noEditPoints="1" noAdjustHandles="1" noChangeArrowheads="1" noChangeShapeType="1" noTextEdit="1"/>
+          </p:cNvSpPr>
+          <p:nvPr>
+            <p:extLst>
+              <p:ext uri="{386F3935-93C4-4BCD-93E2-E3B085C9AB24}">
+                <p16:designElem xmlns:p16="http://schemas.microsoft.com/office/powerpoint/2015/main" val="1"/>
+              </p:ext>
+            </p:extLst>
+          </p:nvPr>
+        </p:nvSpPr>
+        <p:spPr>
+          <a:xfrm>
+            <a:off x="0" y="0"/>
+            <a:ext cx="12188952" cy="6858000"/>
+          </a:xfrm>
+          <a:prstGeom prst="rect">
+            <a:avLst/>
+          </a:prstGeom>
+          <a:ln>
+            <a:noFill/>
+          </a:ln>
+        </p:spPr>
+        <p:style>
+          <a:lnRef idx="2">
+            <a:schemeClr val="accent1">
+              <a:shade val="50000"/>
+            </a:schemeClr>
+          </a:lnRef>
+          <a:fillRef idx="1">
+            <a:schemeClr val="accent1"/>
+          </a:fillRef>
+          <a:effectRef idx="0">
+            <a:schemeClr val="accent1"/>
+          </a:effectRef>
+          <a:fontRef idx="minor">
+            <a:schemeClr val="lt1"/>
+          </a:fontRef>
+        </p:style>
+        <p:txBody>
+          <a:bodyPr rtlCol="0" anchor="ctr"/>
+          <a:lstStyle/>
+          <a:p>
+            <a:pPr algn="ctr"/>
+            <a:endParaRPr lang="en-US"/>
+          </a:p>
+        </p:txBody>
+      </p:sp>
+      <p:sp>
+        <p:nvSpPr>
+          <p:cNvPr id="2" name="Title 1">
+            <a:extLst>
+              <a:ext uri="{FF2B5EF4-FFF2-40B4-BE49-F238E27FC236}">
+                <a16:creationId xmlns:a16="http://schemas.microsoft.com/office/drawing/2014/main" id="{8914C442-E974-988D-294E-92EA24E112D5}"/>
+              </a:ext>
+            </a:extLst>
+          </p:cNvPr>
+          <p:cNvSpPr>
+            <a:spLocks noGrp="1"/>
+          </p:cNvSpPr>
+          <p:nvPr>
+            <p:ph type="title"/>
+          </p:nvPr>
+        </p:nvSpPr>
+        <p:spPr>
+          <a:xfrm>
+            <a:off x="838200" y="365125"/>
+            <a:ext cx="10515600" cy="1325563"/>
+          </a:xfrm>
+        </p:spPr>
+        <p:txBody>
+          <a:bodyPr>
+            <a:normAutofit/>
+          </a:bodyPr>
+          <a:lstStyle/>
+          <a:p>
+            <a:r>
+              <a:rPr lang="en-US" sz="5400" dirty="0"/>
+              <a:t>Business Logic vs Other logic</a:t>
+            </a:r>
+          </a:p>
+        </p:txBody>
+      </p:sp>
+      <p:sp>
+        <p:nvSpPr>
+          <p:cNvPr id="10" name="sketch line">
+            <a:extLst>
+              <a:ext uri="{FF2B5EF4-FFF2-40B4-BE49-F238E27FC236}">
+                <a16:creationId xmlns:a16="http://schemas.microsoft.com/office/drawing/2014/main" id="{D6B4D6EA-99E7-3C21-6C50-984A838BA473}"/>
+              </a:ext>
+              <a:ext uri="{C183D7F6-B498-43B3-948B-1728B52AA6E4}">
+                <adec:decorative xmlns:adec="http://schemas.microsoft.com/office/drawing/2017/decorative" val="1"/>
+              </a:ext>
+            </a:extLst>
+          </p:cNvPr>
+          <p:cNvSpPr>
+            <a:spLocks noGrp="1" noRot="1" noChangeAspect="1" noMove="1" noResize="1" noEditPoints="1" noAdjustHandles="1" noChangeArrowheads="1" noChangeShapeType="1" noTextEdit="1"/>
+          </p:cNvSpPr>
+          <p:nvPr>
+            <p:extLst>
+              <p:ext uri="{386F3935-93C4-4BCD-93E2-E3B085C9AB24}">
+                <p16:designElem xmlns:p16="http://schemas.microsoft.com/office/powerpoint/2015/main" val="1"/>
+              </p:ext>
+            </p:extLst>
+          </p:nvPr>
+        </p:nvSpPr>
+        <p:spPr>
+          <a:xfrm>
+            <a:off x="669036" y="1677373"/>
+            <a:ext cx="10853928" cy="18288"/>
+          </a:xfrm>
+          <a:custGeom>
+            <a:avLst/>
+            <a:gdLst>
+              <a:gd name="csX0" fmla="*/ 0 w 10853928"/>
+              <a:gd name="csY0" fmla="*/ 0 h 18288"/>
+              <a:gd name="csX1" fmla="*/ 461292 w 10853928"/>
+              <a:gd name="csY1" fmla="*/ 0 h 18288"/>
+              <a:gd name="csX2" fmla="*/ 1139662 w 10853928"/>
+              <a:gd name="csY2" fmla="*/ 0 h 18288"/>
+              <a:gd name="csX3" fmla="*/ 1926572 w 10853928"/>
+              <a:gd name="csY3" fmla="*/ 0 h 18288"/>
+              <a:gd name="csX4" fmla="*/ 2279325 w 10853928"/>
+              <a:gd name="csY4" fmla="*/ 0 h 18288"/>
+              <a:gd name="csX5" fmla="*/ 2632078 w 10853928"/>
+              <a:gd name="csY5" fmla="*/ 0 h 18288"/>
+              <a:gd name="csX6" fmla="*/ 3527527 w 10853928"/>
+              <a:gd name="csY6" fmla="*/ 0 h 18288"/>
+              <a:gd name="csX7" fmla="*/ 4205897 w 10853928"/>
+              <a:gd name="csY7" fmla="*/ 0 h 18288"/>
+              <a:gd name="csX8" fmla="*/ 4558650 w 10853928"/>
+              <a:gd name="csY8" fmla="*/ 0 h 18288"/>
+              <a:gd name="csX9" fmla="*/ 5237020 w 10853928"/>
+              <a:gd name="csY9" fmla="*/ 0 h 18288"/>
+              <a:gd name="csX10" fmla="*/ 6132469 w 10853928"/>
+              <a:gd name="csY10" fmla="*/ 0 h 18288"/>
+              <a:gd name="csX11" fmla="*/ 6702301 w 10853928"/>
+              <a:gd name="csY11" fmla="*/ 0 h 18288"/>
+              <a:gd name="csX12" fmla="*/ 7272132 w 10853928"/>
+              <a:gd name="csY12" fmla="*/ 0 h 18288"/>
+              <a:gd name="csX13" fmla="*/ 7950502 w 10853928"/>
+              <a:gd name="csY13" fmla="*/ 0 h 18288"/>
+              <a:gd name="csX14" fmla="*/ 8737412 w 10853928"/>
+              <a:gd name="csY14" fmla="*/ 0 h 18288"/>
+              <a:gd name="csX15" fmla="*/ 9524322 w 10853928"/>
+              <a:gd name="csY15" fmla="*/ 0 h 18288"/>
+              <a:gd name="csX16" fmla="*/ 10853928 w 10853928"/>
+              <a:gd name="csY16" fmla="*/ 0 h 18288"/>
+              <a:gd name="csX17" fmla="*/ 10853928 w 10853928"/>
+              <a:gd name="csY17" fmla="*/ 18288 h 18288"/>
+              <a:gd name="csX18" fmla="*/ 10392636 w 10853928"/>
+              <a:gd name="csY18" fmla="*/ 18288 h 18288"/>
+              <a:gd name="csX19" fmla="*/ 9497187 w 10853928"/>
+              <a:gd name="csY19" fmla="*/ 18288 h 18288"/>
+              <a:gd name="csX20" fmla="*/ 8818817 w 10853928"/>
+              <a:gd name="csY20" fmla="*/ 18288 h 18288"/>
+              <a:gd name="csX21" fmla="*/ 8466064 w 10853928"/>
+              <a:gd name="csY21" fmla="*/ 18288 h 18288"/>
+              <a:gd name="csX22" fmla="*/ 7787693 w 10853928"/>
+              <a:gd name="csY22" fmla="*/ 18288 h 18288"/>
+              <a:gd name="csX23" fmla="*/ 7217862 w 10853928"/>
+              <a:gd name="csY23" fmla="*/ 18288 h 18288"/>
+              <a:gd name="csX24" fmla="*/ 6648031 w 10853928"/>
+              <a:gd name="csY24" fmla="*/ 18288 h 18288"/>
+              <a:gd name="csX25" fmla="*/ 6078200 w 10853928"/>
+              <a:gd name="csY25" fmla="*/ 18288 h 18288"/>
+              <a:gd name="csX26" fmla="*/ 5508368 w 10853928"/>
+              <a:gd name="csY26" fmla="*/ 18288 h 18288"/>
+              <a:gd name="csX27" fmla="*/ 4721459 w 10853928"/>
+              <a:gd name="csY27" fmla="*/ 18288 h 18288"/>
+              <a:gd name="csX28" fmla="*/ 4043088 w 10853928"/>
+              <a:gd name="csY28" fmla="*/ 18288 h 18288"/>
+              <a:gd name="csX29" fmla="*/ 3690336 w 10853928"/>
+              <a:gd name="csY29" fmla="*/ 18288 h 18288"/>
+              <a:gd name="csX30" fmla="*/ 3120504 w 10853928"/>
+              <a:gd name="csY30" fmla="*/ 18288 h 18288"/>
+              <a:gd name="csX31" fmla="*/ 2333595 w 10853928"/>
+              <a:gd name="csY31" fmla="*/ 18288 h 18288"/>
+              <a:gd name="csX32" fmla="*/ 1872303 w 10853928"/>
+              <a:gd name="csY32" fmla="*/ 18288 h 18288"/>
+              <a:gd name="csX33" fmla="*/ 976854 w 10853928"/>
+              <a:gd name="csY33" fmla="*/ 18288 h 18288"/>
+              <a:gd name="csX34" fmla="*/ 0 w 10853928"/>
+              <a:gd name="csY34" fmla="*/ 18288 h 18288"/>
+              <a:gd name="csX35" fmla="*/ 0 w 10853928"/>
+              <a:gd name="csY35" fmla="*/ 0 h 18288"/>
+            </a:gdLst>
+            <a:ahLst/>
+            <a:cxnLst>
+              <a:cxn ang="0">
+                <a:pos x="csX0" y="csY0"/>
+              </a:cxn>
+              <a:cxn ang="0">
+                <a:pos x="csX1" y="csY1"/>
+              </a:cxn>
+              <a:cxn ang="0">
+                <a:pos x="csX2" y="csY2"/>
+              </a:cxn>
+              <a:cxn ang="0">
+                <a:pos x="csX3" y="csY3"/>
+              </a:cxn>
+              <a:cxn ang="0">
+                <a:pos x="csX4" y="csY4"/>
+              </a:cxn>
+              <a:cxn ang="0">
+                <a:pos x="csX5" y="csY5"/>
+              </a:cxn>
+              <a:cxn ang="0">
+                <a:pos x="csX6" y="csY6"/>
+              </a:cxn>
+              <a:cxn ang="0">
+                <a:pos x="csX7" y="csY7"/>
+              </a:cxn>
+              <a:cxn ang="0">
+                <a:pos x="csX8" y="csY8"/>
+              </a:cxn>
+              <a:cxn ang="0">
+                <a:pos x="csX9" y="csY9"/>
+              </a:cxn>
+              <a:cxn ang="0">
+                <a:pos x="csX10" y="csY10"/>
+              </a:cxn>
+              <a:cxn ang="0">
+                <a:pos x="csX11" y="csY11"/>
+              </a:cxn>
+              <a:cxn ang="0">
+                <a:pos x="csX12" y="csY12"/>
+              </a:cxn>
+              <a:cxn ang="0">
+                <a:pos x="csX13" y="csY13"/>
+              </a:cxn>
+              <a:cxn ang="0">
+                <a:pos x="csX14" y="csY14"/>
+              </a:cxn>
+              <a:cxn ang="0">
+                <a:pos x="csX15" y="csY15"/>
+              </a:cxn>
+              <a:cxn ang="0">
+                <a:pos x="csX16" y="csY16"/>
+              </a:cxn>
+              <a:cxn ang="0">
+                <a:pos x="csX17" y="csY17"/>
+              </a:cxn>
+              <a:cxn ang="0">
+                <a:pos x="csX18" y="csY18"/>
+              </a:cxn>
+              <a:cxn ang="0">
+                <a:pos x="csX19" y="csY19"/>
+              </a:cxn>
+              <a:cxn ang="0">
+                <a:pos x="csX20" y="csY20"/>
+              </a:cxn>
+              <a:cxn ang="0">
+                <a:pos x="csX21" y="csY21"/>
+              </a:cxn>
+              <a:cxn ang="0">
+                <a:pos x="csX22" y="csY22"/>
+              </a:cxn>
+              <a:cxn ang="0">
+                <a:pos x="csX23" y="csY23"/>
+              </a:cxn>
+              <a:cxn ang="0">
+                <a:pos x="csX24" y="csY24"/>
+              </a:cxn>
+              <a:cxn ang="0">
+                <a:pos x="csX25" y="csY25"/>
+              </a:cxn>
+              <a:cxn ang="0">
+                <a:pos x="csX26" y="csY26"/>
+              </a:cxn>
+              <a:cxn ang="0">
+                <a:pos x="csX27" y="csY27"/>
+              </a:cxn>
+              <a:cxn ang="0">
+                <a:pos x="csX28" y="csY28"/>
+              </a:cxn>
+              <a:cxn ang="0">
+                <a:pos x="csX29" y="csY29"/>
+              </a:cxn>
+              <a:cxn ang="0">
+                <a:pos x="csX30" y="csY30"/>
+              </a:cxn>
+              <a:cxn ang="0">
+                <a:pos x="csX31" y="csY31"/>
+              </a:cxn>
+              <a:cxn ang="0">
+                <a:pos x="csX32" y="csY32"/>
+              </a:cxn>
+              <a:cxn ang="0">
+                <a:pos x="csX33" y="csY33"/>
+              </a:cxn>
+              <a:cxn ang="0">
+                <a:pos x="csX34" y="csY34"/>
+              </a:cxn>
+              <a:cxn ang="0">
+                <a:pos x="csX35" y="csY35"/>
+              </a:cxn>
+            </a:cxnLst>
+            <a:rect l="l" t="t" r="r" b="b"/>
+            <a:pathLst>
+              <a:path w="10853928" h="18288" fill="none" extrusionOk="0">
+                <a:moveTo>
+                  <a:pt x="0" y="0"/>
+                </a:moveTo>
+                <a:cubicBezTo>
+                  <a:pt x="146993" y="-19076"/>
+                  <a:pt x="347684" y="-4790"/>
+                  <a:pt x="461292" y="0"/>
+                </a:cubicBezTo>
+                <a:cubicBezTo>
+                  <a:pt x="574900" y="4790"/>
+                  <a:pt x="808367" y="19821"/>
+                  <a:pt x="1139662" y="0"/>
+                </a:cubicBezTo>
+                <a:cubicBezTo>
+                  <a:pt x="1470957" y="-19821"/>
+                  <a:pt x="1627405" y="5721"/>
+                  <a:pt x="1926572" y="0"/>
+                </a:cubicBezTo>
+                <a:cubicBezTo>
+                  <a:pt x="2225739" y="-5721"/>
+                  <a:pt x="2137730" y="-3235"/>
+                  <a:pt x="2279325" y="0"/>
+                </a:cubicBezTo>
+                <a:cubicBezTo>
+                  <a:pt x="2420920" y="3235"/>
+                  <a:pt x="2456518" y="9685"/>
+                  <a:pt x="2632078" y="0"/>
+                </a:cubicBezTo>
+                <a:cubicBezTo>
+                  <a:pt x="2807638" y="-9685"/>
+                  <a:pt x="3211516" y="-43007"/>
+                  <a:pt x="3527527" y="0"/>
+                </a:cubicBezTo>
+                <a:cubicBezTo>
+                  <a:pt x="3843538" y="43007"/>
+                  <a:pt x="4058833" y="22042"/>
+                  <a:pt x="4205897" y="0"/>
+                </a:cubicBezTo>
+                <a:cubicBezTo>
+                  <a:pt x="4352961" y="-22042"/>
+                  <a:pt x="4474805" y="-11846"/>
+                  <a:pt x="4558650" y="0"/>
+                </a:cubicBezTo>
+                <a:cubicBezTo>
+                  <a:pt x="4642495" y="11846"/>
+                  <a:pt x="5041928" y="-6069"/>
+                  <a:pt x="5237020" y="0"/>
+                </a:cubicBezTo>
+                <a:cubicBezTo>
+                  <a:pt x="5432112" y="6069"/>
+                  <a:pt x="5943266" y="-17479"/>
+                  <a:pt x="6132469" y="0"/>
+                </a:cubicBezTo>
+                <a:cubicBezTo>
+                  <a:pt x="6321672" y="17479"/>
+                  <a:pt x="6483872" y="26234"/>
+                  <a:pt x="6702301" y="0"/>
+                </a:cubicBezTo>
+                <a:cubicBezTo>
+                  <a:pt x="6920730" y="-26234"/>
+                  <a:pt x="6991194" y="-15156"/>
+                  <a:pt x="7272132" y="0"/>
+                </a:cubicBezTo>
+                <a:cubicBezTo>
+                  <a:pt x="7553070" y="15156"/>
+                  <a:pt x="7684444" y="-32961"/>
+                  <a:pt x="7950502" y="0"/>
+                </a:cubicBezTo>
+                <a:cubicBezTo>
+                  <a:pt x="8216560" y="32961"/>
+                  <a:pt x="8493290" y="-10491"/>
+                  <a:pt x="8737412" y="0"/>
+                </a:cubicBezTo>
+                <a:cubicBezTo>
+                  <a:pt x="8981534" y="10491"/>
+                  <a:pt x="9191586" y="-13899"/>
+                  <a:pt x="9524322" y="0"/>
+                </a:cubicBezTo>
+                <a:cubicBezTo>
+                  <a:pt x="9857058" y="13899"/>
+                  <a:pt x="10297509" y="7485"/>
+                  <a:pt x="10853928" y="0"/>
+                </a:cubicBezTo>
+                <a:cubicBezTo>
+                  <a:pt x="10854574" y="4451"/>
+                  <a:pt x="10854418" y="9226"/>
+                  <a:pt x="10853928" y="18288"/>
+                </a:cubicBezTo>
+                <a:cubicBezTo>
+                  <a:pt x="10691638" y="28522"/>
+                  <a:pt x="10574319" y="29578"/>
+                  <a:pt x="10392636" y="18288"/>
+                </a:cubicBezTo>
+                <a:cubicBezTo>
+                  <a:pt x="10210953" y="6998"/>
+                  <a:pt x="9836277" y="-16742"/>
+                  <a:pt x="9497187" y="18288"/>
+                </a:cubicBezTo>
+                <a:cubicBezTo>
+                  <a:pt x="9158097" y="53318"/>
+                  <a:pt x="9119479" y="30714"/>
+                  <a:pt x="8818817" y="18288"/>
+                </a:cubicBezTo>
+                <a:cubicBezTo>
+                  <a:pt x="8518155" y="5863"/>
+                  <a:pt x="8640037" y="6483"/>
+                  <a:pt x="8466064" y="18288"/>
+                </a:cubicBezTo>
+                <a:cubicBezTo>
+                  <a:pt x="8292091" y="30093"/>
+                  <a:pt x="7997656" y="18914"/>
+                  <a:pt x="7787693" y="18288"/>
+                </a:cubicBezTo>
+                <a:cubicBezTo>
+                  <a:pt x="7577730" y="17662"/>
+                  <a:pt x="7412468" y="21416"/>
+                  <a:pt x="7217862" y="18288"/>
+                </a:cubicBezTo>
+                <a:cubicBezTo>
+                  <a:pt x="7023256" y="15160"/>
+                  <a:pt x="6898018" y="14824"/>
+                  <a:pt x="6648031" y="18288"/>
+                </a:cubicBezTo>
+                <a:cubicBezTo>
+                  <a:pt x="6398044" y="21752"/>
+                  <a:pt x="6254402" y="38625"/>
+                  <a:pt x="6078200" y="18288"/>
+                </a:cubicBezTo>
+                <a:cubicBezTo>
+                  <a:pt x="5901998" y="-2049"/>
+                  <a:pt x="5622886" y="3213"/>
+                  <a:pt x="5508368" y="18288"/>
+                </a:cubicBezTo>
+                <a:cubicBezTo>
+                  <a:pt x="5393850" y="33363"/>
+                  <a:pt x="5036260" y="26830"/>
+                  <a:pt x="4721459" y="18288"/>
+                </a:cubicBezTo>
+                <a:cubicBezTo>
+                  <a:pt x="4406658" y="9746"/>
+                  <a:pt x="4239221" y="41551"/>
+                  <a:pt x="4043088" y="18288"/>
+                </a:cubicBezTo>
+                <a:cubicBezTo>
+                  <a:pt x="3846955" y="-4975"/>
+                  <a:pt x="3818802" y="34658"/>
+                  <a:pt x="3690336" y="18288"/>
+                </a:cubicBezTo>
+                <a:cubicBezTo>
+                  <a:pt x="3561870" y="1918"/>
+                  <a:pt x="3265491" y="42194"/>
+                  <a:pt x="3120504" y="18288"/>
+                </a:cubicBezTo>
+                <a:cubicBezTo>
+                  <a:pt x="2975517" y="-5618"/>
+                  <a:pt x="2720254" y="36673"/>
+                  <a:pt x="2333595" y="18288"/>
+                </a:cubicBezTo>
+                <a:cubicBezTo>
+                  <a:pt x="1946936" y="-97"/>
+                  <a:pt x="2097241" y="5776"/>
+                  <a:pt x="1872303" y="18288"/>
+                </a:cubicBezTo>
+                <a:cubicBezTo>
+                  <a:pt x="1647365" y="30800"/>
+                  <a:pt x="1282708" y="45380"/>
+                  <a:pt x="976854" y="18288"/>
+                </a:cubicBezTo>
+                <a:cubicBezTo>
+                  <a:pt x="671000" y="-8804"/>
+                  <a:pt x="408401" y="-12775"/>
+                  <a:pt x="0" y="18288"/>
+                </a:cubicBezTo>
+                <a:cubicBezTo>
+                  <a:pt x="-213" y="9468"/>
+                  <a:pt x="187" y="4459"/>
+                  <a:pt x="0" y="0"/>
+                </a:cubicBezTo>
+                <a:close/>
+              </a:path>
+              <a:path w="10853928" h="18288" stroke="0" extrusionOk="0">
+                <a:moveTo>
+                  <a:pt x="0" y="0"/>
+                </a:moveTo>
+                <a:cubicBezTo>
+                  <a:pt x="267322" y="15284"/>
+                  <a:pt x="415388" y="-21048"/>
+                  <a:pt x="569831" y="0"/>
+                </a:cubicBezTo>
+                <a:cubicBezTo>
+                  <a:pt x="724274" y="21048"/>
+                  <a:pt x="769333" y="-2353"/>
+                  <a:pt x="922584" y="0"/>
+                </a:cubicBezTo>
+                <a:cubicBezTo>
+                  <a:pt x="1075835" y="2353"/>
+                  <a:pt x="1399490" y="-145"/>
+                  <a:pt x="1818033" y="0"/>
+                </a:cubicBezTo>
+                <a:cubicBezTo>
+                  <a:pt x="2236576" y="145"/>
+                  <a:pt x="2145330" y="5482"/>
+                  <a:pt x="2387864" y="0"/>
+                </a:cubicBezTo>
+                <a:cubicBezTo>
+                  <a:pt x="2630398" y="-5482"/>
+                  <a:pt x="2793207" y="18487"/>
+                  <a:pt x="2957695" y="0"/>
+                </a:cubicBezTo>
+                <a:cubicBezTo>
+                  <a:pt x="3122183" y="-18487"/>
+                  <a:pt x="3579141" y="19003"/>
+                  <a:pt x="3853144" y="0"/>
+                </a:cubicBezTo>
+                <a:cubicBezTo>
+                  <a:pt x="4127147" y="-19003"/>
+                  <a:pt x="4209857" y="12211"/>
+                  <a:pt x="4314436" y="0"/>
+                </a:cubicBezTo>
+                <a:cubicBezTo>
+                  <a:pt x="4419015" y="-12211"/>
+                  <a:pt x="4762459" y="-17220"/>
+                  <a:pt x="5209885" y="0"/>
+                </a:cubicBezTo>
+                <a:cubicBezTo>
+                  <a:pt x="5657311" y="17220"/>
+                  <a:pt x="5692663" y="-3290"/>
+                  <a:pt x="6105335" y="0"/>
+                </a:cubicBezTo>
+                <a:cubicBezTo>
+                  <a:pt x="6518007" y="3290"/>
+                  <a:pt x="6455516" y="-5124"/>
+                  <a:pt x="6783705" y="0"/>
+                </a:cubicBezTo>
+                <a:cubicBezTo>
+                  <a:pt x="7111894" y="5124"/>
+                  <a:pt x="7441941" y="-17829"/>
+                  <a:pt x="7679154" y="0"/>
+                </a:cubicBezTo>
+                <a:cubicBezTo>
+                  <a:pt x="7916367" y="17829"/>
+                  <a:pt x="8102967" y="-24363"/>
+                  <a:pt x="8248985" y="0"/>
+                </a:cubicBezTo>
+                <a:cubicBezTo>
+                  <a:pt x="8395003" y="24363"/>
+                  <a:pt x="8552393" y="25505"/>
+                  <a:pt x="8818817" y="0"/>
+                </a:cubicBezTo>
+                <a:cubicBezTo>
+                  <a:pt x="9085241" y="-25505"/>
+                  <a:pt x="9411308" y="38000"/>
+                  <a:pt x="9605726" y="0"/>
+                </a:cubicBezTo>
+                <a:cubicBezTo>
+                  <a:pt x="9800144" y="-38000"/>
+                  <a:pt x="10006468" y="-25741"/>
+                  <a:pt x="10175558" y="0"/>
+                </a:cubicBezTo>
+                <a:cubicBezTo>
+                  <a:pt x="10344648" y="25741"/>
+                  <a:pt x="10696282" y="695"/>
+                  <a:pt x="10853928" y="0"/>
+                </a:cubicBezTo>
+                <a:cubicBezTo>
+                  <a:pt x="10853521" y="8690"/>
+                  <a:pt x="10853774" y="14141"/>
+                  <a:pt x="10853928" y="18288"/>
+                </a:cubicBezTo>
+                <a:cubicBezTo>
+                  <a:pt x="10608124" y="24255"/>
+                  <a:pt x="10343415" y="22307"/>
+                  <a:pt x="10067018" y="18288"/>
+                </a:cubicBezTo>
+                <a:cubicBezTo>
+                  <a:pt x="9790621" y="14270"/>
+                  <a:pt x="9843266" y="3564"/>
+                  <a:pt x="9714266" y="18288"/>
+                </a:cubicBezTo>
+                <a:cubicBezTo>
+                  <a:pt x="9585266" y="33012"/>
+                  <a:pt x="9379484" y="1875"/>
+                  <a:pt x="9252974" y="18288"/>
+                </a:cubicBezTo>
+                <a:cubicBezTo>
+                  <a:pt x="9126464" y="34701"/>
+                  <a:pt x="8580678" y="-4904"/>
+                  <a:pt x="8357525" y="18288"/>
+                </a:cubicBezTo>
+                <a:cubicBezTo>
+                  <a:pt x="8134372" y="41480"/>
+                  <a:pt x="7903199" y="26458"/>
+                  <a:pt x="7679154" y="18288"/>
+                </a:cubicBezTo>
+                <a:cubicBezTo>
+                  <a:pt x="7455109" y="10118"/>
+                  <a:pt x="7435944" y="27109"/>
+                  <a:pt x="7217862" y="18288"/>
+                </a:cubicBezTo>
+                <a:cubicBezTo>
+                  <a:pt x="6999780" y="9467"/>
+                  <a:pt x="6680409" y="18985"/>
+                  <a:pt x="6539492" y="18288"/>
+                </a:cubicBezTo>
+                <a:cubicBezTo>
+                  <a:pt x="6398575" y="17592"/>
+                  <a:pt x="6312077" y="33018"/>
+                  <a:pt x="6186739" y="18288"/>
+                </a:cubicBezTo>
+                <a:cubicBezTo>
+                  <a:pt x="6061401" y="3558"/>
+                  <a:pt x="5947033" y="12075"/>
+                  <a:pt x="5833986" y="18288"/>
+                </a:cubicBezTo>
+                <a:cubicBezTo>
+                  <a:pt x="5720939" y="24501"/>
+                  <a:pt x="5482226" y="8586"/>
+                  <a:pt x="5155616" y="18288"/>
+                </a:cubicBezTo>
+                <a:cubicBezTo>
+                  <a:pt x="4829006" y="27991"/>
+                  <a:pt x="4841274" y="29316"/>
+                  <a:pt x="4694324" y="18288"/>
+                </a:cubicBezTo>
+                <a:cubicBezTo>
+                  <a:pt x="4547374" y="7260"/>
+                  <a:pt x="4077675" y="7013"/>
+                  <a:pt x="3907414" y="18288"/>
+                </a:cubicBezTo>
+                <a:cubicBezTo>
+                  <a:pt x="3737153" y="29564"/>
+                  <a:pt x="3538393" y="21630"/>
+                  <a:pt x="3446122" y="18288"/>
+                </a:cubicBezTo>
+                <a:cubicBezTo>
+                  <a:pt x="3353851" y="14946"/>
+                  <a:pt x="2990320" y="-8091"/>
+                  <a:pt x="2659212" y="18288"/>
+                </a:cubicBezTo>
+                <a:cubicBezTo>
+                  <a:pt x="2328104" y="44667"/>
+                  <a:pt x="2427653" y="9607"/>
+                  <a:pt x="2306460" y="18288"/>
+                </a:cubicBezTo>
+                <a:cubicBezTo>
+                  <a:pt x="2185267" y="26969"/>
+                  <a:pt x="1719763" y="3717"/>
+                  <a:pt x="1519550" y="18288"/>
+                </a:cubicBezTo>
+                <a:cubicBezTo>
+                  <a:pt x="1319337" y="32860"/>
+                  <a:pt x="1167371" y="17040"/>
+                  <a:pt x="1058258" y="18288"/>
+                </a:cubicBezTo>
+                <a:cubicBezTo>
+                  <a:pt x="949145" y="19536"/>
+                  <a:pt x="780234" y="31447"/>
+                  <a:pt x="705505" y="18288"/>
+                </a:cubicBezTo>
+                <a:cubicBezTo>
+                  <a:pt x="630776" y="5129"/>
+                  <a:pt x="215796" y="30056"/>
+                  <a:pt x="0" y="18288"/>
+                </a:cubicBezTo>
+                <a:cubicBezTo>
+                  <a:pt x="-53" y="11301"/>
+                  <a:pt x="-649" y="7756"/>
+                  <a:pt x="0" y="0"/>
+                </a:cubicBezTo>
+                <a:close/>
+              </a:path>
+            </a:pathLst>
+          </a:custGeom>
+          <a:solidFill>
+            <a:schemeClr val="accent2"/>
+          </a:solidFill>
+          <a:ln w="41275" cap="rnd">
+            <a:solidFill>
+              <a:schemeClr val="accent2"/>
+            </a:solidFill>
+            <a:round/>
+            <a:extLst>
+              <a:ext uri="{C807C97D-BFC1-408E-A445-0C87EB9F89A2}">
+                <ask:lineSketchStyleProps xmlns:ask="http://schemas.microsoft.com/office/drawing/2018/sketchyshapes" sd="1219033472">
+                  <a:prstGeom prst="rect">
+                    <a:avLst/>
+                  </a:prstGeom>
+                  <ask:type>
+                    <ask:lineSketchFreehand/>
+                  </ask:type>
+                </ask:lineSketchStyleProps>
+              </a:ext>
+            </a:extLst>
+          </a:ln>
+        </p:spPr>
+        <p:style>
+          <a:lnRef idx="2">
+            <a:schemeClr val="accent1">
+              <a:shade val="50000"/>
+            </a:schemeClr>
+          </a:lnRef>
+          <a:fillRef idx="1">
+            <a:schemeClr val="accent1"/>
+          </a:fillRef>
+          <a:effectRef idx="0">
+            <a:schemeClr val="accent1"/>
+          </a:effectRef>
+          <a:fontRef idx="minor">
+            <a:schemeClr val="lt1"/>
+          </a:fontRef>
+        </p:style>
+        <p:txBody>
+          <a:bodyPr rtlCol="0" anchor="ctr"/>
+          <a:lstStyle/>
+          <a:p>
+            <a:pPr algn="ctr"/>
+            <a:endParaRPr lang="en-US"/>
+          </a:p>
+        </p:txBody>
+      </p:sp>
+      <p:sp>
+        <p:nvSpPr>
+          <p:cNvPr id="3" name="Content Placeholder 2">
+            <a:extLst>
+              <a:ext uri="{FF2B5EF4-FFF2-40B4-BE49-F238E27FC236}">
+                <a16:creationId xmlns:a16="http://schemas.microsoft.com/office/drawing/2014/main" id="{7F01B539-6D2D-BD6C-11D8-913928F24928}"/>
+              </a:ext>
+            </a:extLst>
+          </p:cNvPr>
+          <p:cNvSpPr>
+            <a:spLocks noGrp="1"/>
+          </p:cNvSpPr>
+          <p:nvPr>
+            <p:ph idx="1"/>
+          </p:nvPr>
+        </p:nvSpPr>
+        <p:spPr>
+          <a:xfrm>
+            <a:off x="838200" y="1929384"/>
+            <a:ext cx="10515600" cy="4251960"/>
+          </a:xfrm>
+        </p:spPr>
+        <p:txBody>
+          <a:bodyPr>
+            <a:normAutofit/>
+          </a:bodyPr>
+          <a:lstStyle/>
+          <a:p>
+            <a:r>
+              <a:rPr lang="en-US" sz="1800" dirty="0"/>
+              <a:t>Business logic is the logic that is unique to the business problem you are trying to solve. </a:t>
+            </a:r>
+          </a:p>
+          <a:p>
+            <a:r>
+              <a:rPr lang="en-US" sz="1800" dirty="0"/>
+              <a:t>It can be very unique</a:t>
+            </a:r>
+          </a:p>
+          <a:p>
+            <a:pPr lvl="1"/>
+            <a:r>
+              <a:rPr lang="en-US" sz="1400" dirty="0"/>
+              <a:t>Examples</a:t>
+            </a:r>
+          </a:p>
+          <a:p>
+            <a:pPr lvl="2"/>
+            <a:r>
+              <a:rPr lang="en-US" sz="1000" dirty="0"/>
+              <a:t>Logic to drop a message in a queue is common across industries</a:t>
+            </a:r>
+          </a:p>
+          <a:p>
+            <a:pPr lvl="2"/>
+            <a:r>
+              <a:rPr lang="en-US" sz="1000" dirty="0"/>
+              <a:t>Logic that specifies that customers with certain amount of purchases get a discount is very </a:t>
+            </a:r>
+            <a:r>
+              <a:rPr lang="en-US" sz="1000" dirty="0" err="1"/>
+              <a:t>speciifc</a:t>
+            </a:r>
+            <a:r>
+              <a:rPr lang="en-US" sz="1000" dirty="0"/>
+              <a:t>.</a:t>
+            </a:r>
+          </a:p>
+          <a:p>
+            <a:r>
+              <a:rPr lang="en-US" sz="1800" dirty="0"/>
+              <a:t>It can be executed in a vacuum with no direct dependencies on external resources</a:t>
+            </a:r>
+          </a:p>
+        </p:txBody>
+      </p:sp>
+    </p:spTree>
+    <p:extLst>
+      <p:ext uri="{BB962C8B-B14F-4D97-AF65-F5344CB8AC3E}">
+        <p14:creationId xmlns:p14="http://schemas.microsoft.com/office/powerpoint/2010/main" val="3681795694"/>
+      </p:ext>
+    </p:extLst>
+  </p:cSld>
+  <p:clrMapOvr>
+    <a:masterClrMapping/>
+  </p:clrMapOvr>
+</p:sld>
+</file>
+
+<file path=ppt/slides/slide7.xml><?xml version="1.0" encoding="utf-8"?>
+<p:sld xmlns:a="http://schemas.openxmlformats.org/drawingml/2006/main" xmlns:r="http://schemas.openxmlformats.org/officeDocument/2006/relationships" xmlns:p="http://schemas.openxmlformats.org/presentationml/2006/main">
+  <p:cSld>
+    <p:bg>
+      <p:bgPr>
+        <a:solidFill>
+          <a:schemeClr val="bg1"/>
+        </a:solidFill>
+        <a:effectLst/>
+      </p:bgPr>
+    </p:bg>
+    <p:spTree>
+      <p:nvGrpSpPr>
+        <p:cNvPr id="1" name="">
+          <a:extLst>
+            <a:ext uri="{FF2B5EF4-FFF2-40B4-BE49-F238E27FC236}">
               <a16:creationId xmlns:a16="http://schemas.microsoft.com/office/drawing/2014/main" id="{F06B4CC0-BDED-B9D3-A847-01342D2310A1}"/>
             </a:ext>
           </a:extLst>
@@ -15381,7 +16619,7 @@
 </p:sld>
 </file>
 
-<file path=ppt/slides/slide7.xml><?xml version="1.0" encoding="utf-8"?>
+<file path=ppt/slides/slide8.xml><?xml version="1.0" encoding="utf-8"?>
 <p:sld xmlns:a="http://schemas.openxmlformats.org/drawingml/2006/main" xmlns:r="http://schemas.openxmlformats.org/officeDocument/2006/relationships" xmlns:p="http://schemas.openxmlformats.org/presentationml/2006/main">
   <p:cSld>
     <p:bg>
@@ -16264,7 +17502,7 @@
 </p:sld>
 </file>
 
-<file path=ppt/slides/slide8.xml><?xml version="1.0" encoding="utf-8"?>
+<file path=ppt/slides/slide9.xml><?xml version="1.0" encoding="utf-8"?>
 <p:sld xmlns:a="http://schemas.openxmlformats.org/drawingml/2006/main" xmlns:r="http://schemas.openxmlformats.org/officeDocument/2006/relationships" xmlns:p="http://schemas.openxmlformats.org/presentationml/2006/main">
   <p:cSld>
     <p:bg>
@@ -16653,89 +17891,6 @@
     <p:extLst>
       <p:ext uri="{BB962C8B-B14F-4D97-AF65-F5344CB8AC3E}">
         <p14:creationId xmlns:p14="http://schemas.microsoft.com/office/powerpoint/2010/main" val="2726405216"/>
-      </p:ext>
-    </p:extLst>
-  </p:cSld>
-  <p:clrMapOvr>
-    <a:masterClrMapping/>
-  </p:clrMapOvr>
-</p:sld>
-</file>
-
-<file path=ppt/slides/slide9.xml><?xml version="1.0" encoding="utf-8"?>
-<p:sld xmlns:a="http://schemas.openxmlformats.org/drawingml/2006/main" xmlns:r="http://schemas.openxmlformats.org/officeDocument/2006/relationships" xmlns:p="http://schemas.openxmlformats.org/presentationml/2006/main">
-  <p:cSld>
-    <p:spTree>
-      <p:nvGrpSpPr>
-        <p:cNvPr id="1" name=""/>
-        <p:cNvGrpSpPr/>
-        <p:nvPr/>
-      </p:nvGrpSpPr>
-      <p:grpSpPr>
-        <a:xfrm>
-          <a:off x="0" y="0"/>
-          <a:ext cx="0" cy="0"/>
-          <a:chOff x="0" y="0"/>
-          <a:chExt cx="0" cy="0"/>
-        </a:xfrm>
-      </p:grpSpPr>
-      <p:sp>
-        <p:nvSpPr>
-          <p:cNvPr id="4" name="Title 3">
-            <a:extLst>
-              <a:ext uri="{FF2B5EF4-FFF2-40B4-BE49-F238E27FC236}">
-                <a16:creationId xmlns:a16="http://schemas.microsoft.com/office/drawing/2014/main" id="{47C3B51B-CD1E-84E5-E7B2-ED12B12BB2EC}"/>
-              </a:ext>
-            </a:extLst>
-          </p:cNvPr>
-          <p:cNvSpPr>
-            <a:spLocks noGrp="1"/>
-          </p:cNvSpPr>
-          <p:nvPr>
-            <p:ph type="ctrTitle"/>
-          </p:nvPr>
-        </p:nvSpPr>
-        <p:spPr/>
-        <p:txBody>
-          <a:bodyPr/>
-          <a:lstStyle/>
-          <a:p>
-            <a:r>
-              <a:rPr lang="en-US" dirty="0"/>
-              <a:t>Demo</a:t>
-            </a:r>
-          </a:p>
-        </p:txBody>
-      </p:sp>
-      <p:sp>
-        <p:nvSpPr>
-          <p:cNvPr id="5" name="Subtitle 4">
-            <a:extLst>
-              <a:ext uri="{FF2B5EF4-FFF2-40B4-BE49-F238E27FC236}">
-                <a16:creationId xmlns:a16="http://schemas.microsoft.com/office/drawing/2014/main" id="{C3E3E2C1-3777-0AA9-FFD7-C0605B1B0494}"/>
-              </a:ext>
-            </a:extLst>
-          </p:cNvPr>
-          <p:cNvSpPr>
-            <a:spLocks noGrp="1"/>
-          </p:cNvSpPr>
-          <p:nvPr>
-            <p:ph type="subTitle" idx="1"/>
-          </p:nvPr>
-        </p:nvSpPr>
-        <p:spPr/>
-        <p:txBody>
-          <a:bodyPr/>
-          <a:lstStyle/>
-          <a:p>
-            <a:endParaRPr lang="en-US"/>
-          </a:p>
-        </p:txBody>
-      </p:sp>
-    </p:spTree>
-    <p:extLst>
-      <p:ext uri="{BB962C8B-B14F-4D97-AF65-F5344CB8AC3E}">
-        <p14:creationId xmlns:p14="http://schemas.microsoft.com/office/powerpoint/2010/main" val="2253528452"/>
       </p:ext>
     </p:extLst>
   </p:cSld>

</xml_diff>